<commit_message>
update structural patterns ppt
</commit_message>
<xml_diff>
--- a/PPT Presentations/DesignPatterns-StructuralPatterns.pptx
+++ b/PPT Presentations/DesignPatterns-StructuralPatterns.pptx
@@ -5,7 +5,7 @@
     <p:sldMasterId id="2147483660" r:id="rId4"/>
   </p:sldMasterIdLst>
   <p:notesMasterIdLst>
-    <p:notesMasterId r:id="rId22"/>
+    <p:notesMasterId r:id="rId23"/>
   </p:notesMasterIdLst>
   <p:sldIdLst>
     <p:sldId id="287" r:id="rId5"/>
@@ -24,7 +24,8 @@
     <p:sldId id="300" r:id="rId18"/>
     <p:sldId id="301" r:id="rId19"/>
     <p:sldId id="302" r:id="rId20"/>
-    <p:sldId id="303" r:id="rId21"/>
+    <p:sldId id="304" r:id="rId21"/>
+    <p:sldId id="303" r:id="rId22"/>
   </p:sldIdLst>
   <p:sldSz cx="12192000" cy="6858000"/>
   <p:notesSz cx="6858000" cy="9144000"/>
@@ -5759,8 +5760,8 @@
     <dgm:cxn modelId="{B69A751B-F5A4-4FDF-A1ED-C6E1EE94BDBA}" type="presOf" srcId="{F8289849-E987-4255-8EC8-44B4F81CB10E}" destId="{7DE8E408-DE79-443F-8629-C089FBA689E3}" srcOrd="0" destOrd="0" presId="urn:microsoft.com/office/officeart/2018/2/layout/IconVerticalSolidList"/>
     <dgm:cxn modelId="{2C52642D-1657-4F8D-BBDD-B987CC65BE05}" srcId="{730B5E20-22E8-49EE-849D-2F09EB7C5E55}" destId="{D18979C8-D283-4F11-8056-816DA377F0C0}" srcOrd="3" destOrd="0" parTransId="{88215926-66BF-48C4-A93B-2B9055E4B30E}" sibTransId="{69F2F367-DB05-4C42-B3B6-E5FAE86F9F26}"/>
     <dgm:cxn modelId="{27CB5032-1C28-4B71-9DE7-3B8573DAA06B}" type="presOf" srcId="{D18979C8-D283-4F11-8056-816DA377F0C0}" destId="{77CFAC55-D3CF-45EA-A63C-9656646CA42E}" srcOrd="0" destOrd="0" presId="urn:microsoft.com/office/officeart/2018/2/layout/IconVerticalSolidList"/>
+    <dgm:cxn modelId="{70466650-EF21-44D4-9C56-FBD4098B58CE}" srcId="{730B5E20-22E8-49EE-849D-2F09EB7C5E55}" destId="{B987AC83-493B-4B18-BBDE-1E83EAF7E925}" srcOrd="2" destOrd="0" parTransId="{8B487908-3605-4A42-980E-D4512632196F}" sibTransId="{3871E768-D972-4239-9CDD-D2C93D59DC76}"/>
     <dgm:cxn modelId="{36BA1767-35CA-4C91-93C5-94F0ADD921AD}" type="presOf" srcId="{730B5E20-22E8-49EE-849D-2F09EB7C5E55}" destId="{933F326E-830B-4831-B1CB-C533857382D0}" srcOrd="0" destOrd="0" presId="urn:microsoft.com/office/officeart/2018/2/layout/IconVerticalSolidList"/>
-    <dgm:cxn modelId="{70466650-EF21-44D4-9C56-FBD4098B58CE}" srcId="{730B5E20-22E8-49EE-849D-2F09EB7C5E55}" destId="{B987AC83-493B-4B18-BBDE-1E83EAF7E925}" srcOrd="2" destOrd="0" parTransId="{8B487908-3605-4A42-980E-D4512632196F}" sibTransId="{3871E768-D972-4239-9CDD-D2C93D59DC76}"/>
     <dgm:cxn modelId="{0DECB193-7D07-48D4-B4D0-8A44B02B0EFC}" srcId="{730B5E20-22E8-49EE-849D-2F09EB7C5E55}" destId="{F8289849-E987-4255-8EC8-44B4F81CB10E}" srcOrd="1" destOrd="0" parTransId="{58406139-B729-43A1-9AA7-0431547BE2D4}" sibTransId="{CFDFBA7F-EFFF-4644-9D4D-D4EA2AB33D7D}"/>
     <dgm:cxn modelId="{44162A95-8BE4-488C-B835-013E9523D7C9}" type="presOf" srcId="{B987AC83-493B-4B18-BBDE-1E83EAF7E925}" destId="{B9DB9720-3FDF-4ACB-85FA-66976B22A528}" srcOrd="0" destOrd="0" presId="urn:microsoft.com/office/officeart/2018/2/layout/IconVerticalSolidList"/>
     <dgm:cxn modelId="{CBA314A9-2DA4-4A96-8AAA-82DB60A2107B}" type="presOf" srcId="{D23F440E-398D-41B6-A80F-74494D5847CA}" destId="{E59E20F8-4207-45B4-B668-018957100416}" srcOrd="0" destOrd="0" presId="urn:microsoft.com/office/officeart/2018/2/layout/IconVerticalSolidList"/>
@@ -6187,8 +6188,8 @@
     <dgm:cxn modelId="{B69A751B-F5A4-4FDF-A1ED-C6E1EE94BDBA}" type="presOf" srcId="{F8289849-E987-4255-8EC8-44B4F81CB10E}" destId="{7DE8E408-DE79-443F-8629-C089FBA689E3}" srcOrd="0" destOrd="0" presId="urn:microsoft.com/office/officeart/2018/2/layout/IconVerticalSolidList"/>
     <dgm:cxn modelId="{2C52642D-1657-4F8D-BBDD-B987CC65BE05}" srcId="{730B5E20-22E8-49EE-849D-2F09EB7C5E55}" destId="{D18979C8-D283-4F11-8056-816DA377F0C0}" srcOrd="3" destOrd="0" parTransId="{88215926-66BF-48C4-A93B-2B9055E4B30E}" sibTransId="{69F2F367-DB05-4C42-B3B6-E5FAE86F9F26}"/>
     <dgm:cxn modelId="{27CB5032-1C28-4B71-9DE7-3B8573DAA06B}" type="presOf" srcId="{D18979C8-D283-4F11-8056-816DA377F0C0}" destId="{77CFAC55-D3CF-45EA-A63C-9656646CA42E}" srcOrd="0" destOrd="0" presId="urn:microsoft.com/office/officeart/2018/2/layout/IconVerticalSolidList"/>
+    <dgm:cxn modelId="{70466650-EF21-44D4-9C56-FBD4098B58CE}" srcId="{730B5E20-22E8-49EE-849D-2F09EB7C5E55}" destId="{B987AC83-493B-4B18-BBDE-1E83EAF7E925}" srcOrd="2" destOrd="0" parTransId="{8B487908-3605-4A42-980E-D4512632196F}" sibTransId="{3871E768-D972-4239-9CDD-D2C93D59DC76}"/>
     <dgm:cxn modelId="{36BA1767-35CA-4C91-93C5-94F0ADD921AD}" type="presOf" srcId="{730B5E20-22E8-49EE-849D-2F09EB7C5E55}" destId="{933F326E-830B-4831-B1CB-C533857382D0}" srcOrd="0" destOrd="0" presId="urn:microsoft.com/office/officeart/2018/2/layout/IconVerticalSolidList"/>
-    <dgm:cxn modelId="{70466650-EF21-44D4-9C56-FBD4098B58CE}" srcId="{730B5E20-22E8-49EE-849D-2F09EB7C5E55}" destId="{B987AC83-493B-4B18-BBDE-1E83EAF7E925}" srcOrd="2" destOrd="0" parTransId="{8B487908-3605-4A42-980E-D4512632196F}" sibTransId="{3871E768-D972-4239-9CDD-D2C93D59DC76}"/>
     <dgm:cxn modelId="{0DECB193-7D07-48D4-B4D0-8A44B02B0EFC}" srcId="{730B5E20-22E8-49EE-849D-2F09EB7C5E55}" destId="{F8289849-E987-4255-8EC8-44B4F81CB10E}" srcOrd="1" destOrd="0" parTransId="{58406139-B729-43A1-9AA7-0431547BE2D4}" sibTransId="{CFDFBA7F-EFFF-4644-9D4D-D4EA2AB33D7D}"/>
     <dgm:cxn modelId="{44162A95-8BE4-488C-B835-013E9523D7C9}" type="presOf" srcId="{B987AC83-493B-4B18-BBDE-1E83EAF7E925}" destId="{B9DB9720-3FDF-4ACB-85FA-66976B22A528}" srcOrd="0" destOrd="0" presId="urn:microsoft.com/office/officeart/2018/2/layout/IconVerticalSolidList"/>
     <dgm:cxn modelId="{CBA314A9-2DA4-4A96-8AAA-82DB60A2107B}" type="presOf" srcId="{D23F440E-398D-41B6-A80F-74494D5847CA}" destId="{E59E20F8-4207-45B4-B668-018957100416}" srcOrd="0" destOrd="0" presId="urn:microsoft.com/office/officeart/2018/2/layout/IconVerticalSolidList"/>
@@ -6626,8 +6627,8 @@
     <dgm:cxn modelId="{B69A751B-F5A4-4FDF-A1ED-C6E1EE94BDBA}" type="presOf" srcId="{F8289849-E987-4255-8EC8-44B4F81CB10E}" destId="{7DE8E408-DE79-443F-8629-C089FBA689E3}" srcOrd="0" destOrd="0" presId="urn:microsoft.com/office/officeart/2018/2/layout/IconVerticalSolidList"/>
     <dgm:cxn modelId="{2C52642D-1657-4F8D-BBDD-B987CC65BE05}" srcId="{730B5E20-22E8-49EE-849D-2F09EB7C5E55}" destId="{D18979C8-D283-4F11-8056-816DA377F0C0}" srcOrd="3" destOrd="0" parTransId="{88215926-66BF-48C4-A93B-2B9055E4B30E}" sibTransId="{69F2F367-DB05-4C42-B3B6-E5FAE86F9F26}"/>
     <dgm:cxn modelId="{27CB5032-1C28-4B71-9DE7-3B8573DAA06B}" type="presOf" srcId="{D18979C8-D283-4F11-8056-816DA377F0C0}" destId="{77CFAC55-D3CF-45EA-A63C-9656646CA42E}" srcOrd="0" destOrd="0" presId="urn:microsoft.com/office/officeart/2018/2/layout/IconVerticalSolidList"/>
+    <dgm:cxn modelId="{70466650-EF21-44D4-9C56-FBD4098B58CE}" srcId="{730B5E20-22E8-49EE-849D-2F09EB7C5E55}" destId="{B987AC83-493B-4B18-BBDE-1E83EAF7E925}" srcOrd="2" destOrd="0" parTransId="{8B487908-3605-4A42-980E-D4512632196F}" sibTransId="{3871E768-D972-4239-9CDD-D2C93D59DC76}"/>
     <dgm:cxn modelId="{36BA1767-35CA-4C91-93C5-94F0ADD921AD}" type="presOf" srcId="{730B5E20-22E8-49EE-849D-2F09EB7C5E55}" destId="{933F326E-830B-4831-B1CB-C533857382D0}" srcOrd="0" destOrd="0" presId="urn:microsoft.com/office/officeart/2018/2/layout/IconVerticalSolidList"/>
-    <dgm:cxn modelId="{70466650-EF21-44D4-9C56-FBD4098B58CE}" srcId="{730B5E20-22E8-49EE-849D-2F09EB7C5E55}" destId="{B987AC83-493B-4B18-BBDE-1E83EAF7E925}" srcOrd="2" destOrd="0" parTransId="{8B487908-3605-4A42-980E-D4512632196F}" sibTransId="{3871E768-D972-4239-9CDD-D2C93D59DC76}"/>
     <dgm:cxn modelId="{0DECB193-7D07-48D4-B4D0-8A44B02B0EFC}" srcId="{730B5E20-22E8-49EE-849D-2F09EB7C5E55}" destId="{F8289849-E987-4255-8EC8-44B4F81CB10E}" srcOrd="1" destOrd="0" parTransId="{58406139-B729-43A1-9AA7-0431547BE2D4}" sibTransId="{CFDFBA7F-EFFF-4644-9D4D-D4EA2AB33D7D}"/>
     <dgm:cxn modelId="{44162A95-8BE4-488C-B835-013E9523D7C9}" type="presOf" srcId="{B987AC83-493B-4B18-BBDE-1E83EAF7E925}" destId="{B9DB9720-3FDF-4ACB-85FA-66976B22A528}" srcOrd="0" destOrd="0" presId="urn:microsoft.com/office/officeart/2018/2/layout/IconVerticalSolidList"/>
     <dgm:cxn modelId="{CBA314A9-2DA4-4A96-8AAA-82DB60A2107B}" type="presOf" srcId="{D23F440E-398D-41B6-A80F-74494D5847CA}" destId="{E59E20F8-4207-45B4-B668-018957100416}" srcOrd="0" destOrd="0" presId="urn:microsoft.com/office/officeart/2018/2/layout/IconVerticalSolidList"/>
@@ -7054,8 +7055,8 @@
     <dgm:cxn modelId="{B69A751B-F5A4-4FDF-A1ED-C6E1EE94BDBA}" type="presOf" srcId="{F8289849-E987-4255-8EC8-44B4F81CB10E}" destId="{7DE8E408-DE79-443F-8629-C089FBA689E3}" srcOrd="0" destOrd="0" presId="urn:microsoft.com/office/officeart/2018/2/layout/IconVerticalSolidList"/>
     <dgm:cxn modelId="{2C52642D-1657-4F8D-BBDD-B987CC65BE05}" srcId="{730B5E20-22E8-49EE-849D-2F09EB7C5E55}" destId="{D18979C8-D283-4F11-8056-816DA377F0C0}" srcOrd="3" destOrd="0" parTransId="{88215926-66BF-48C4-A93B-2B9055E4B30E}" sibTransId="{69F2F367-DB05-4C42-B3B6-E5FAE86F9F26}"/>
     <dgm:cxn modelId="{27CB5032-1C28-4B71-9DE7-3B8573DAA06B}" type="presOf" srcId="{D18979C8-D283-4F11-8056-816DA377F0C0}" destId="{77CFAC55-D3CF-45EA-A63C-9656646CA42E}" srcOrd="0" destOrd="0" presId="urn:microsoft.com/office/officeart/2018/2/layout/IconVerticalSolidList"/>
+    <dgm:cxn modelId="{70466650-EF21-44D4-9C56-FBD4098B58CE}" srcId="{730B5E20-22E8-49EE-849D-2F09EB7C5E55}" destId="{B987AC83-493B-4B18-BBDE-1E83EAF7E925}" srcOrd="2" destOrd="0" parTransId="{8B487908-3605-4A42-980E-D4512632196F}" sibTransId="{3871E768-D972-4239-9CDD-D2C93D59DC76}"/>
     <dgm:cxn modelId="{36BA1767-35CA-4C91-93C5-94F0ADD921AD}" type="presOf" srcId="{730B5E20-22E8-49EE-849D-2F09EB7C5E55}" destId="{933F326E-830B-4831-B1CB-C533857382D0}" srcOrd="0" destOrd="0" presId="urn:microsoft.com/office/officeart/2018/2/layout/IconVerticalSolidList"/>
-    <dgm:cxn modelId="{70466650-EF21-44D4-9C56-FBD4098B58CE}" srcId="{730B5E20-22E8-49EE-849D-2F09EB7C5E55}" destId="{B987AC83-493B-4B18-BBDE-1E83EAF7E925}" srcOrd="2" destOrd="0" parTransId="{8B487908-3605-4A42-980E-D4512632196F}" sibTransId="{3871E768-D972-4239-9CDD-D2C93D59DC76}"/>
     <dgm:cxn modelId="{0DECB193-7D07-48D4-B4D0-8A44B02B0EFC}" srcId="{730B5E20-22E8-49EE-849D-2F09EB7C5E55}" destId="{F8289849-E987-4255-8EC8-44B4F81CB10E}" srcOrd="1" destOrd="0" parTransId="{58406139-B729-43A1-9AA7-0431547BE2D4}" sibTransId="{CFDFBA7F-EFFF-4644-9D4D-D4EA2AB33D7D}"/>
     <dgm:cxn modelId="{44162A95-8BE4-488C-B835-013E9523D7C9}" type="presOf" srcId="{B987AC83-493B-4B18-BBDE-1E83EAF7E925}" destId="{B9DB9720-3FDF-4ACB-85FA-66976B22A528}" srcOrd="0" destOrd="0" presId="urn:microsoft.com/office/officeart/2018/2/layout/IconVerticalSolidList"/>
     <dgm:cxn modelId="{CBA314A9-2DA4-4A96-8AAA-82DB60A2107B}" type="presOf" srcId="{D23F440E-398D-41B6-A80F-74494D5847CA}" destId="{E59E20F8-4207-45B4-B668-018957100416}" srcOrd="0" destOrd="0" presId="urn:microsoft.com/office/officeart/2018/2/layout/IconVerticalSolidList"/>
@@ -7487,8 +7488,8 @@
     <dgm:cxn modelId="{B69A751B-F5A4-4FDF-A1ED-C6E1EE94BDBA}" type="presOf" srcId="{F8289849-E987-4255-8EC8-44B4F81CB10E}" destId="{7DE8E408-DE79-443F-8629-C089FBA689E3}" srcOrd="0" destOrd="0" presId="urn:microsoft.com/office/officeart/2018/2/layout/IconVerticalSolidList"/>
     <dgm:cxn modelId="{2C52642D-1657-4F8D-BBDD-B987CC65BE05}" srcId="{730B5E20-22E8-49EE-849D-2F09EB7C5E55}" destId="{D18979C8-D283-4F11-8056-816DA377F0C0}" srcOrd="3" destOrd="0" parTransId="{88215926-66BF-48C4-A93B-2B9055E4B30E}" sibTransId="{69F2F367-DB05-4C42-B3B6-E5FAE86F9F26}"/>
     <dgm:cxn modelId="{27CB5032-1C28-4B71-9DE7-3B8573DAA06B}" type="presOf" srcId="{D18979C8-D283-4F11-8056-816DA377F0C0}" destId="{77CFAC55-D3CF-45EA-A63C-9656646CA42E}" srcOrd="0" destOrd="0" presId="urn:microsoft.com/office/officeart/2018/2/layout/IconVerticalSolidList"/>
+    <dgm:cxn modelId="{70466650-EF21-44D4-9C56-FBD4098B58CE}" srcId="{730B5E20-22E8-49EE-849D-2F09EB7C5E55}" destId="{B987AC83-493B-4B18-BBDE-1E83EAF7E925}" srcOrd="2" destOrd="0" parTransId="{8B487908-3605-4A42-980E-D4512632196F}" sibTransId="{3871E768-D972-4239-9CDD-D2C93D59DC76}"/>
     <dgm:cxn modelId="{36BA1767-35CA-4C91-93C5-94F0ADD921AD}" type="presOf" srcId="{730B5E20-22E8-49EE-849D-2F09EB7C5E55}" destId="{933F326E-830B-4831-B1CB-C533857382D0}" srcOrd="0" destOrd="0" presId="urn:microsoft.com/office/officeart/2018/2/layout/IconVerticalSolidList"/>
-    <dgm:cxn modelId="{70466650-EF21-44D4-9C56-FBD4098B58CE}" srcId="{730B5E20-22E8-49EE-849D-2F09EB7C5E55}" destId="{B987AC83-493B-4B18-BBDE-1E83EAF7E925}" srcOrd="2" destOrd="0" parTransId="{8B487908-3605-4A42-980E-D4512632196F}" sibTransId="{3871E768-D972-4239-9CDD-D2C93D59DC76}"/>
     <dgm:cxn modelId="{0DECB193-7D07-48D4-B4D0-8A44B02B0EFC}" srcId="{730B5E20-22E8-49EE-849D-2F09EB7C5E55}" destId="{F8289849-E987-4255-8EC8-44B4F81CB10E}" srcOrd="1" destOrd="0" parTransId="{58406139-B729-43A1-9AA7-0431547BE2D4}" sibTransId="{CFDFBA7F-EFFF-4644-9D4D-D4EA2AB33D7D}"/>
     <dgm:cxn modelId="{44162A95-8BE4-488C-B835-013E9523D7C9}" type="presOf" srcId="{B987AC83-493B-4B18-BBDE-1E83EAF7E925}" destId="{B9DB9720-3FDF-4ACB-85FA-66976B22A528}" srcOrd="0" destOrd="0" presId="urn:microsoft.com/office/officeart/2018/2/layout/IconVerticalSolidList"/>
     <dgm:cxn modelId="{CBA314A9-2DA4-4A96-8AAA-82DB60A2107B}" type="presOf" srcId="{D23F440E-398D-41B6-A80F-74494D5847CA}" destId="{E59E20F8-4207-45B4-B668-018957100416}" srcOrd="0" destOrd="0" presId="urn:microsoft.com/office/officeart/2018/2/layout/IconVerticalSolidList"/>
@@ -7922,8 +7923,8 @@
     <dgm:cxn modelId="{B69A751B-F5A4-4FDF-A1ED-C6E1EE94BDBA}" type="presOf" srcId="{F8289849-E987-4255-8EC8-44B4F81CB10E}" destId="{7DE8E408-DE79-443F-8629-C089FBA689E3}" srcOrd="0" destOrd="0" presId="urn:microsoft.com/office/officeart/2018/2/layout/IconVerticalSolidList"/>
     <dgm:cxn modelId="{2C52642D-1657-4F8D-BBDD-B987CC65BE05}" srcId="{730B5E20-22E8-49EE-849D-2F09EB7C5E55}" destId="{D18979C8-D283-4F11-8056-816DA377F0C0}" srcOrd="3" destOrd="0" parTransId="{88215926-66BF-48C4-A93B-2B9055E4B30E}" sibTransId="{69F2F367-DB05-4C42-B3B6-E5FAE86F9F26}"/>
     <dgm:cxn modelId="{27CB5032-1C28-4B71-9DE7-3B8573DAA06B}" type="presOf" srcId="{D18979C8-D283-4F11-8056-816DA377F0C0}" destId="{77CFAC55-D3CF-45EA-A63C-9656646CA42E}" srcOrd="0" destOrd="0" presId="urn:microsoft.com/office/officeart/2018/2/layout/IconVerticalSolidList"/>
+    <dgm:cxn modelId="{70466650-EF21-44D4-9C56-FBD4098B58CE}" srcId="{730B5E20-22E8-49EE-849D-2F09EB7C5E55}" destId="{B987AC83-493B-4B18-BBDE-1E83EAF7E925}" srcOrd="2" destOrd="0" parTransId="{8B487908-3605-4A42-980E-D4512632196F}" sibTransId="{3871E768-D972-4239-9CDD-D2C93D59DC76}"/>
     <dgm:cxn modelId="{36BA1767-35CA-4C91-93C5-94F0ADD921AD}" type="presOf" srcId="{730B5E20-22E8-49EE-849D-2F09EB7C5E55}" destId="{933F326E-830B-4831-B1CB-C533857382D0}" srcOrd="0" destOrd="0" presId="urn:microsoft.com/office/officeart/2018/2/layout/IconVerticalSolidList"/>
-    <dgm:cxn modelId="{70466650-EF21-44D4-9C56-FBD4098B58CE}" srcId="{730B5E20-22E8-49EE-849D-2F09EB7C5E55}" destId="{B987AC83-493B-4B18-BBDE-1E83EAF7E925}" srcOrd="2" destOrd="0" parTransId="{8B487908-3605-4A42-980E-D4512632196F}" sibTransId="{3871E768-D972-4239-9CDD-D2C93D59DC76}"/>
     <dgm:cxn modelId="{0DECB193-7D07-48D4-B4D0-8A44B02B0EFC}" srcId="{730B5E20-22E8-49EE-849D-2F09EB7C5E55}" destId="{F8289849-E987-4255-8EC8-44B4F81CB10E}" srcOrd="1" destOrd="0" parTransId="{58406139-B729-43A1-9AA7-0431547BE2D4}" sibTransId="{CFDFBA7F-EFFF-4644-9D4D-D4EA2AB33D7D}"/>
     <dgm:cxn modelId="{44162A95-8BE4-488C-B835-013E9523D7C9}" type="presOf" srcId="{B987AC83-493B-4B18-BBDE-1E83EAF7E925}" destId="{B9DB9720-3FDF-4ACB-85FA-66976B22A528}" srcOrd="0" destOrd="0" presId="urn:microsoft.com/office/officeart/2018/2/layout/IconVerticalSolidList"/>
     <dgm:cxn modelId="{CBA314A9-2DA4-4A96-8AAA-82DB60A2107B}" type="presOf" srcId="{D23F440E-398D-41B6-A80F-74494D5847CA}" destId="{E59E20F8-4207-45B4-B668-018957100416}" srcOrd="0" destOrd="0" presId="urn:microsoft.com/office/officeart/2018/2/layout/IconVerticalSolidList"/>
@@ -8355,8 +8356,8 @@
     <dgm:cxn modelId="{B69A751B-F5A4-4FDF-A1ED-C6E1EE94BDBA}" type="presOf" srcId="{F8289849-E987-4255-8EC8-44B4F81CB10E}" destId="{7DE8E408-DE79-443F-8629-C089FBA689E3}" srcOrd="0" destOrd="0" presId="urn:microsoft.com/office/officeart/2018/2/layout/IconVerticalSolidList"/>
     <dgm:cxn modelId="{2C52642D-1657-4F8D-BBDD-B987CC65BE05}" srcId="{730B5E20-22E8-49EE-849D-2F09EB7C5E55}" destId="{D18979C8-D283-4F11-8056-816DA377F0C0}" srcOrd="3" destOrd="0" parTransId="{88215926-66BF-48C4-A93B-2B9055E4B30E}" sibTransId="{69F2F367-DB05-4C42-B3B6-E5FAE86F9F26}"/>
     <dgm:cxn modelId="{27CB5032-1C28-4B71-9DE7-3B8573DAA06B}" type="presOf" srcId="{D18979C8-D283-4F11-8056-816DA377F0C0}" destId="{77CFAC55-D3CF-45EA-A63C-9656646CA42E}" srcOrd="0" destOrd="0" presId="urn:microsoft.com/office/officeart/2018/2/layout/IconVerticalSolidList"/>
+    <dgm:cxn modelId="{70466650-EF21-44D4-9C56-FBD4098B58CE}" srcId="{730B5E20-22E8-49EE-849D-2F09EB7C5E55}" destId="{B987AC83-493B-4B18-BBDE-1E83EAF7E925}" srcOrd="2" destOrd="0" parTransId="{8B487908-3605-4A42-980E-D4512632196F}" sibTransId="{3871E768-D972-4239-9CDD-D2C93D59DC76}"/>
     <dgm:cxn modelId="{36BA1767-35CA-4C91-93C5-94F0ADD921AD}" type="presOf" srcId="{730B5E20-22E8-49EE-849D-2F09EB7C5E55}" destId="{933F326E-830B-4831-B1CB-C533857382D0}" srcOrd="0" destOrd="0" presId="urn:microsoft.com/office/officeart/2018/2/layout/IconVerticalSolidList"/>
-    <dgm:cxn modelId="{70466650-EF21-44D4-9C56-FBD4098B58CE}" srcId="{730B5E20-22E8-49EE-849D-2F09EB7C5E55}" destId="{B987AC83-493B-4B18-BBDE-1E83EAF7E925}" srcOrd="2" destOrd="0" parTransId="{8B487908-3605-4A42-980E-D4512632196F}" sibTransId="{3871E768-D972-4239-9CDD-D2C93D59DC76}"/>
     <dgm:cxn modelId="{0DECB193-7D07-48D4-B4D0-8A44B02B0EFC}" srcId="{730B5E20-22E8-49EE-849D-2F09EB7C5E55}" destId="{F8289849-E987-4255-8EC8-44B4F81CB10E}" srcOrd="1" destOrd="0" parTransId="{58406139-B729-43A1-9AA7-0431547BE2D4}" sibTransId="{CFDFBA7F-EFFF-4644-9D4D-D4EA2AB33D7D}"/>
     <dgm:cxn modelId="{44162A95-8BE4-488C-B835-013E9523D7C9}" type="presOf" srcId="{B987AC83-493B-4B18-BBDE-1E83EAF7E925}" destId="{B9DB9720-3FDF-4ACB-85FA-66976B22A528}" srcOrd="0" destOrd="0" presId="urn:microsoft.com/office/officeart/2018/2/layout/IconVerticalSolidList"/>
     <dgm:cxn modelId="{CBA314A9-2DA4-4A96-8AAA-82DB60A2107B}" type="presOf" srcId="{D23F440E-398D-41B6-A80F-74494D5847CA}" destId="{E59E20F8-4207-45B4-B668-018957100416}" srcOrd="0" destOrd="0" presId="urn:microsoft.com/office/officeart/2018/2/layout/IconVerticalSolidList"/>
@@ -22325,7 +22326,7 @@
           <a:p>
             <a:fld id="{9FB25228-C6B1-4EA6-96EA-5B49C3E6D19C}" type="datetimeFigureOut">
               <a:rPr lang="en-US" smtClean="0"/>
-              <a:t>3/31/2021</a:t>
+              <a:t>3/16/22</a:t>
             </a:fld>
             <a:endParaRPr lang="en-US"/>
           </a:p>
@@ -23582,6 +23583,20 @@
           <a:lstStyle/>
           <a:p>
             <a:r>
+              <a:rPr lang="en-GB" sz="1200" b="1" i="0" kern="1200" dirty="0">
+                <a:solidFill>
+                  <a:schemeClr val="tx1"/>
+                </a:solidFill>
+                <a:effectLst/>
+                <a:latin typeface="+mn-lt"/>
+                <a:ea typeface="+mn-ea"/>
+                <a:cs typeface="+mn-cs"/>
+              </a:rPr>
+              <a:t>Use the Proxy Pattern to create a representative object that controls access to another object, which may be remote, expensive to create, or in need of securing.</a:t>
+            </a:r>
+          </a:p>
+          <a:p>
+            <a:r>
               <a:rPr lang="en-US" dirty="0"/>
               <a:t>Provide a substitute/placeholder for another object, something intermediary.</a:t>
             </a:r>
@@ -23611,8 +23626,21 @@
             </a:pPr>
             <a:r>
               <a:rPr lang="en-US" dirty="0"/>
-              <a:t>Security reasons (want to check access before executing an operation) -&gt; protection proxy</a:t>
+              <a:t>Security reasons (want to check access before executing an operation) -&gt; protection proxy, </a:t>
             </a:r>
+            <a:r>
+              <a:rPr lang="en-GB" sz="1200" b="0" i="0" kern="1200" dirty="0">
+                <a:solidFill>
+                  <a:schemeClr val="tx1"/>
+                </a:solidFill>
+                <a:effectLst/>
+                <a:latin typeface="+mn-lt"/>
+                <a:ea typeface="+mn-ea"/>
+                <a:cs typeface="+mn-cs"/>
+              </a:rPr>
+              <a:t>controls access to a resource based on access rights</a:t>
+            </a:r>
+            <a:endParaRPr lang="en-US" dirty="0"/>
           </a:p>
           <a:p>
             <a:pPr marL="171450" indent="-171450">
@@ -23621,8 +23649,33 @@
             </a:pPr>
             <a:r>
               <a:rPr lang="en-US" dirty="0"/>
-              <a:t>Lazy initialization -&gt; virtual proxy</a:t>
+              <a:t>Lazy initialization -&gt; virtual proxy, c</a:t>
             </a:r>
+            <a:r>
+              <a:rPr lang="en-GB" sz="1200" b="0" i="0" kern="1200" dirty="0" err="1">
+                <a:solidFill>
+                  <a:schemeClr val="tx1"/>
+                </a:solidFill>
+                <a:effectLst/>
+                <a:latin typeface="+mn-lt"/>
+                <a:ea typeface="+mn-ea"/>
+                <a:cs typeface="+mn-cs"/>
+              </a:rPr>
+              <a:t>ontrols</a:t>
+            </a:r>
+            <a:r>
+              <a:rPr lang="en-GB" sz="1200" b="0" i="0" kern="1200" dirty="0">
+                <a:solidFill>
+                  <a:schemeClr val="tx1"/>
+                </a:solidFill>
+                <a:effectLst/>
+                <a:latin typeface="+mn-lt"/>
+                <a:ea typeface="+mn-ea"/>
+                <a:cs typeface="+mn-cs"/>
+              </a:rPr>
+              <a:t> access to a resource that is expensive to create</a:t>
+            </a:r>
+            <a:endParaRPr lang="en-US" dirty="0"/>
           </a:p>
           <a:p>
             <a:pPr marL="171450" indent="-171450">
@@ -23641,8 +23694,21 @@
             </a:pPr>
             <a:r>
               <a:rPr lang="en-US" dirty="0"/>
-              <a:t>Pass requests over the network -&gt; remote proxy</a:t>
+              <a:t>Pass requests over the network -&gt; remote proxy, </a:t>
             </a:r>
+            <a:r>
+              <a:rPr lang="en-GB" sz="1200" b="0" i="0" kern="1200" dirty="0">
+                <a:solidFill>
+                  <a:schemeClr val="tx1"/>
+                </a:solidFill>
+                <a:effectLst/>
+                <a:latin typeface="+mn-lt"/>
+                <a:ea typeface="+mn-ea"/>
+                <a:cs typeface="+mn-cs"/>
+              </a:rPr>
+              <a:t>controls access to a remote object.</a:t>
+            </a:r>
+            <a:endParaRPr lang="en-US" dirty="0"/>
           </a:p>
         </p:txBody>
       </p:sp>
@@ -23673,6 +23739,90 @@
     <p:extLst>
       <p:ext uri="{BB962C8B-B14F-4D97-AF65-F5344CB8AC3E}">
         <p14:creationId xmlns:p14="http://schemas.microsoft.com/office/powerpoint/2010/main" val="350032244"/>
+      </p:ext>
+    </p:extLst>
+  </p:cSld>
+  <p:clrMapOvr>
+    <a:masterClrMapping/>
+  </p:clrMapOvr>
+</p:notes>
+</file>
+
+<file path=ppt/notesSlides/notesSlide7.xml><?xml version="1.0" encoding="utf-8"?>
+<p:notes xmlns:a="http://schemas.openxmlformats.org/drawingml/2006/main" xmlns:r="http://schemas.openxmlformats.org/officeDocument/2006/relationships" xmlns:p="http://schemas.openxmlformats.org/presentationml/2006/main">
+  <p:cSld>
+    <p:spTree>
+      <p:nvGrpSpPr>
+        <p:cNvPr id="1" name=""/>
+        <p:cNvGrpSpPr/>
+        <p:nvPr/>
+      </p:nvGrpSpPr>
+      <p:grpSpPr>
+        <a:xfrm>
+          <a:off x="0" y="0"/>
+          <a:ext cx="0" cy="0"/>
+          <a:chOff x="0" y="0"/>
+          <a:chExt cx="0" cy="0"/>
+        </a:xfrm>
+      </p:grpSpPr>
+      <p:sp>
+        <p:nvSpPr>
+          <p:cNvPr id="2" name="Slide Image Placeholder 1"/>
+          <p:cNvSpPr>
+            <a:spLocks noGrp="1" noRot="1" noChangeAspect="1"/>
+          </p:cNvSpPr>
+          <p:nvPr>
+            <p:ph type="sldImg"/>
+          </p:nvPr>
+        </p:nvSpPr>
+        <p:spPr/>
+      </p:sp>
+      <p:sp>
+        <p:nvSpPr>
+          <p:cNvPr id="3" name="Notes Placeholder 2"/>
+          <p:cNvSpPr>
+            <a:spLocks noGrp="1"/>
+          </p:cNvSpPr>
+          <p:nvPr>
+            <p:ph type="body" idx="1"/>
+          </p:nvPr>
+        </p:nvSpPr>
+        <p:spPr/>
+        <p:txBody>
+          <a:bodyPr/>
+          <a:lstStyle/>
+          <a:p>
+            <a:endParaRPr lang="en-RO" dirty="0"/>
+          </a:p>
+        </p:txBody>
+      </p:sp>
+      <p:sp>
+        <p:nvSpPr>
+          <p:cNvPr id="4" name="Slide Number Placeholder 3"/>
+          <p:cNvSpPr>
+            <a:spLocks noGrp="1"/>
+          </p:cNvSpPr>
+          <p:nvPr>
+            <p:ph type="sldNum" sz="quarter" idx="5"/>
+          </p:nvPr>
+        </p:nvSpPr>
+        <p:spPr/>
+        <p:txBody>
+          <a:bodyPr/>
+          <a:lstStyle/>
+          <a:p>
+            <a:fld id="{BD723AC1-94C2-45AF-A25E-9C765FAB9473}" type="slidenum">
+              <a:rPr lang="en-US" smtClean="0"/>
+              <a:t>17</a:t>
+            </a:fld>
+            <a:endParaRPr lang="en-US"/>
+          </a:p>
+        </p:txBody>
+      </p:sp>
+    </p:spTree>
+    <p:extLst>
+      <p:ext uri="{BB962C8B-B14F-4D97-AF65-F5344CB8AC3E}">
+        <p14:creationId xmlns:p14="http://schemas.microsoft.com/office/powerpoint/2010/main" val="2200969341"/>
       </p:ext>
     </p:extLst>
   </p:cSld>
@@ -23926,7 +24076,7 @@
           <a:p>
             <a:fld id="{9184DA70-C731-4C70-880D-CCD4705E623C}" type="datetime1">
               <a:rPr lang="en-US" smtClean="0"/>
-              <a:t>3/31/2021</a:t>
+              <a:t>3/16/22</a:t>
             </a:fld>
             <a:endParaRPr lang="en-US" dirty="0"/>
           </a:p>
@@ -24114,7 +24264,7 @@
           <a:p>
             <a:fld id="{4BE1D723-8F53-4F53-90B0-1982A396982E}" type="datetime1">
               <a:rPr lang="en-US" smtClean="0"/>
-              <a:t>3/31/2021</a:t>
+              <a:t>3/16/22</a:t>
             </a:fld>
             <a:endParaRPr lang="en-US" dirty="0"/>
           </a:p>
@@ -24487,7 +24637,7 @@
           <a:p>
             <a:fld id="{97669AF7-7BEB-44E4-9852-375E34362B5B}" type="datetime1">
               <a:rPr lang="en-US" smtClean="0"/>
-              <a:t>3/31/2021</a:t>
+              <a:t>3/16/22</a:t>
             </a:fld>
             <a:endParaRPr lang="en-US" dirty="0"/>
           </a:p>
@@ -24742,7 +24892,7 @@
           <a:p>
             <a:fld id="{BAAAC38D-0552-4C82-B593-E6124DFADBE2}" type="datetime1">
               <a:rPr lang="en-US" smtClean="0"/>
-              <a:t>3/31/2021</a:t>
+              <a:t>3/16/22</a:t>
             </a:fld>
             <a:endParaRPr lang="en-US" dirty="0"/>
           </a:p>
@@ -25139,7 +25289,7 @@
           <a:p>
             <a:fld id="{D9DF0F1C-5577-4ACB-BB62-DF8F3C494C7E}" type="datetime1">
               <a:rPr lang="en-US" smtClean="0"/>
-              <a:t>3/31/2021</a:t>
+              <a:t>3/16/22</a:t>
             </a:fld>
             <a:endParaRPr lang="en-US" dirty="0"/>
           </a:p>
@@ -25275,7 +25425,7 @@
           <a:p>
             <a:fld id="{1775B394-D9F9-4F0C-B15D-605F45CB9E9F}" type="datetime1">
               <a:rPr lang="en-US" smtClean="0"/>
-              <a:t>3/31/2021</a:t>
+              <a:t>3/16/22</a:t>
             </a:fld>
             <a:endParaRPr lang="en-US" dirty="0"/>
           </a:p>
@@ -25432,7 +25582,7 @@
           <a:p>
             <a:fld id="{39667345-2558-425A-8533-9BFDBCE15005}" type="datetime1">
               <a:rPr lang="en-US" smtClean="0"/>
-              <a:t>3/31/2021</a:t>
+              <a:t>3/16/22</a:t>
             </a:fld>
             <a:endParaRPr lang="en-US" dirty="0"/>
           </a:p>
@@ -25761,7 +25911,7 @@
           <a:p>
             <a:fld id="{92BEA474-078D-4E9B-9B14-09A87B19DC46}" type="datetime1">
               <a:rPr lang="en-US" smtClean="0"/>
-              <a:t>3/31/2021</a:t>
+              <a:t>3/16/22</a:t>
             </a:fld>
             <a:endParaRPr lang="en-US" dirty="0"/>
           </a:p>
@@ -26111,7 +26261,7 @@
           <a:p>
             <a:fld id="{4907D986-8816-4272-A432-0437A28A9828}" type="datetime1">
               <a:rPr lang="en-US" smtClean="0"/>
-              <a:t>3/31/2021</a:t>
+              <a:t>3/16/22</a:t>
             </a:fld>
             <a:endParaRPr lang="en-US" dirty="0"/>
           </a:p>
@@ -26372,7 +26522,7 @@
           <a:p>
             <a:fld id="{62D6E202-B606-4609-B914-27C9371A1F6D}" type="datetime1">
               <a:rPr lang="en-US" smtClean="0"/>
-              <a:t>3/31/2021</a:t>
+              <a:t>3/16/22</a:t>
             </a:fld>
             <a:endParaRPr lang="en-US" dirty="0"/>
           </a:p>
@@ -28763,6 +28913,14 @@
               <a:rPr lang="en-US" sz="4000" dirty="0"/>
               <a:t>Flyweight</a:t>
             </a:r>
+            <a:br>
+              <a:rPr lang="en-US" sz="4000" dirty="0"/>
+            </a:br>
+            <a:r>
+              <a:rPr lang="en-GB" sz="2000" dirty="0"/>
+              <a:t>is used when a class has many instances, and they can all be controlled identically</a:t>
+            </a:r>
+            <a:endParaRPr lang="en-US" sz="4000" dirty="0"/>
           </a:p>
         </p:txBody>
       </p:sp>
@@ -29113,6 +29271,21 @@
             <a:r>
               <a:rPr lang="en-US" dirty="0"/>
               <a:t> </a:t>
+            </a:r>
+          </a:p>
+          <a:p>
+            <a:pPr marL="201168" lvl="1" indent="0">
+              <a:buNone/>
+            </a:pPr>
+            <a:endParaRPr lang="en-US" dirty="0"/>
+          </a:p>
+          <a:p>
+            <a:pPr marL="201168" lvl="1" indent="0">
+              <a:buNone/>
+            </a:pPr>
+            <a:r>
+              <a:rPr lang="en-US" dirty="0"/>
+              <a:t>Scenario example: on UI (game UI/UX, architecture, landscape design apps, for instance), you have elements like trees, bullets, that only have a coordinate on the screen unique to them, but otherwise they look the same</a:t>
             </a:r>
           </a:p>
         </p:txBody>
@@ -29520,6 +29693,14 @@
               <a:rPr lang="en-US" sz="4000" dirty="0"/>
               <a:t>Proxy</a:t>
             </a:r>
+            <a:br>
+              <a:rPr lang="en-US" sz="4000" dirty="0"/>
+            </a:br>
+            <a:r>
+              <a:rPr lang="en-US" sz="2800" dirty="0"/>
+              <a:t>control and manage access</a:t>
+            </a:r>
+            <a:endParaRPr lang="en-US" sz="4000" dirty="0"/>
           </a:p>
         </p:txBody>
       </p:sp>
@@ -29656,49 +29837,32 @@
       </p:sp>
       <p:pic>
         <p:nvPicPr>
-          <p:cNvPr id="3076" name="Picture 4" descr="Proxy scheme">
+          <p:cNvPr id="2" name="Picture 1">
             <a:extLst>
               <a:ext uri="{FF2B5EF4-FFF2-40B4-BE49-F238E27FC236}">
-                <a16:creationId xmlns:a16="http://schemas.microsoft.com/office/drawing/2014/main" id="{32AE79BE-39C8-459A-B7F8-41B97207AAB4}"/>
+                <a16:creationId xmlns:a16="http://schemas.microsoft.com/office/drawing/2014/main" id="{B8798622-DDEB-EC4E-A1DC-FDF7B2D4D5FD}"/>
               </a:ext>
             </a:extLst>
           </p:cNvPr>
           <p:cNvPicPr>
-            <a:picLocks noChangeAspect="1" noChangeArrowheads="1"/>
+            <a:picLocks noChangeAspect="1"/>
           </p:cNvPicPr>
           <p:nvPr/>
         </p:nvPicPr>
         <p:blipFill>
-          <a:blip r:embed="rId3">
-            <a:extLst>
-              <a:ext uri="{28A0092B-C50C-407E-A947-70E740481C1C}">
-                <a14:useLocalDpi xmlns:a14="http://schemas.microsoft.com/office/drawing/2010/main" val="0"/>
-              </a:ext>
-            </a:extLst>
-          </a:blip>
-          <a:srcRect/>
+          <a:blip r:embed="rId3"/>
           <a:stretch>
             <a:fillRect/>
           </a:stretch>
         </p:blipFill>
-        <p:spPr bwMode="auto">
+        <p:spPr>
           <a:xfrm>
-            <a:off x="3650633" y="681074"/>
-            <a:ext cx="4340273" cy="3218863"/>
+            <a:off x="2893224" y="111311"/>
+            <a:ext cx="6541993" cy="4395770"/>
           </a:xfrm>
           <a:prstGeom prst="rect">
             <a:avLst/>
           </a:prstGeom>
-          <a:noFill/>
-          <a:extLst>
-            <a:ext uri="{909E8E84-426E-40DD-AFC4-6F175D3DCCD1}">
-              <a14:hiddenFill xmlns:a14="http://schemas.microsoft.com/office/drawing/2010/main">
-                <a:solidFill>
-                  <a:srgbClr val="FFFFFF"/>
-                </a:solidFill>
-              </a14:hiddenFill>
-            </a:ext>
-          </a:extLst>
         </p:spPr>
       </p:pic>
     </p:spTree>
@@ -29811,7 +29975,7 @@
         <p:spPr/>
         <p:txBody>
           <a:bodyPr>
-            <a:normAutofit/>
+            <a:normAutofit lnSpcReduction="10000"/>
           </a:bodyPr>
           <a:lstStyle/>
           <a:p>
@@ -29840,6 +30004,15 @@
               <a:t>java.lang.reflect.Proxy</a:t>
             </a:r>
             <a:endParaRPr lang="en-US" dirty="0"/>
+          </a:p>
+          <a:p>
+            <a:pPr marL="201168" lvl="1" indent="0">
+              <a:buNone/>
+            </a:pPr>
+            <a:r>
+              <a:rPr lang="en-US" dirty="0"/>
+              <a:t>Java RMI (example of remote proxy)</a:t>
+            </a:r>
           </a:p>
           <a:p>
             <a:pPr marL="201168" lvl="1" indent="0">
@@ -30036,6 +30209,66 @@
 </file>
 
 <file path=ppt/slides/slide17.xml><?xml version="1.0" encoding="utf-8"?>
+<p:sld xmlns:a="http://schemas.openxmlformats.org/drawingml/2006/main" xmlns:r="http://schemas.openxmlformats.org/officeDocument/2006/relationships" xmlns:p="http://schemas.openxmlformats.org/presentationml/2006/main">
+  <p:cSld>
+    <p:spTree>
+      <p:nvGrpSpPr>
+        <p:cNvPr id="1" name=""/>
+        <p:cNvGrpSpPr/>
+        <p:nvPr/>
+      </p:nvGrpSpPr>
+      <p:grpSpPr>
+        <a:xfrm>
+          <a:off x="0" y="0"/>
+          <a:ext cx="0" cy="0"/>
+          <a:chOff x="0" y="0"/>
+          <a:chExt cx="0" cy="0"/>
+        </a:xfrm>
+      </p:grpSpPr>
+      <p:pic>
+        <p:nvPicPr>
+          <p:cNvPr id="5" name="Picture 4">
+            <a:extLst>
+              <a:ext uri="{FF2B5EF4-FFF2-40B4-BE49-F238E27FC236}">
+                <a16:creationId xmlns:a16="http://schemas.microsoft.com/office/drawing/2014/main" id="{2B2A582C-231F-A841-B0E5-4D1C7869A31C}"/>
+              </a:ext>
+            </a:extLst>
+          </p:cNvPr>
+          <p:cNvPicPr>
+            <a:picLocks noChangeAspect="1"/>
+          </p:cNvPicPr>
+          <p:nvPr/>
+        </p:nvPicPr>
+        <p:blipFill>
+          <a:blip r:embed="rId3"/>
+          <a:stretch>
+            <a:fillRect/>
+          </a:stretch>
+        </p:blipFill>
+        <p:spPr>
+          <a:xfrm>
+            <a:off x="861247" y="671332"/>
+            <a:ext cx="10469505" cy="5190763"/>
+          </a:xfrm>
+          <a:prstGeom prst="rect">
+            <a:avLst/>
+          </a:prstGeom>
+        </p:spPr>
+      </p:pic>
+    </p:spTree>
+    <p:extLst>
+      <p:ext uri="{BB962C8B-B14F-4D97-AF65-F5344CB8AC3E}">
+        <p14:creationId xmlns:p14="http://schemas.microsoft.com/office/powerpoint/2010/main" val="2972370969"/>
+      </p:ext>
+    </p:extLst>
+  </p:cSld>
+  <p:clrMapOvr>
+    <a:masterClrMapping/>
+  </p:clrMapOvr>
+</p:sld>
+</file>
+
+<file path=ppt/slides/slide18.xml><?xml version="1.0" encoding="utf-8"?>
 <p:sld xmlns:a="http://schemas.openxmlformats.org/drawingml/2006/main" xmlns:r="http://schemas.openxmlformats.org/officeDocument/2006/relationships" xmlns:p="http://schemas.openxmlformats.org/presentationml/2006/main">
   <p:cSld>
     <p:spTree>
@@ -30295,7 +30528,7 @@
         </p:spPr>
         <p:txBody>
           <a:bodyPr>
-            <a:normAutofit fontScale="92500" lnSpcReduction="10000"/>
+            <a:normAutofit fontScale="92500"/>
           </a:bodyPr>
           <a:lstStyle/>
           <a:p>
@@ -34022,6 +34255,15 @@
 </file>
 
 <file path=customXml/item1.xml><?xml version="1.0" encoding="utf-8"?>
+<?mso-contentType ?>
+<FormTemplates xmlns="http://schemas.microsoft.com/sharepoint/v3/contenttype/forms">
+  <Display>DocumentLibraryForm</Display>
+  <Edit>DocumentLibraryForm</Edit>
+  <New>DocumentLibraryForm</New>
+</FormTemplates>
+</file>
+
+<file path=customXml/item2.xml><?xml version="1.0" encoding="utf-8"?>
 <ct:contentTypeSchema xmlns:ct="http://schemas.microsoft.com/office/2006/metadata/contentType" xmlns:ma="http://schemas.microsoft.com/office/2006/metadata/properties/metaAttributes" ct:_="" ma:_="" ma:contentTypeName="Document" ma:contentTypeID="0x01010079F111ED35F8CC479449609E8A0923A6" ma:contentTypeVersion="12" ma:contentTypeDescription="Create a new document." ma:contentTypeScope="" ma:versionID="426e97fa315356fffbdcd9876fe988c2">
   <xsd:schema xmlns:xsd="http://www.w3.org/2001/XMLSchema" xmlns:xs="http://www.w3.org/2001/XMLSchema" xmlns:p="http://schemas.microsoft.com/office/2006/metadata/properties" xmlns:ns2="71af3243-3dd4-4a8d-8c0d-dd76da1f02a5" xmlns:ns3="16c05727-aa75-4e4a-9b5f-8a80a1165891" targetNamespace="http://schemas.microsoft.com/office/2006/metadata/properties" ma:root="true" ma:fieldsID="14b8f0def80e6d70ce3def20c90759ae" ns2:_="" ns3:_="">
     <xsd:import namespace="71af3243-3dd4-4a8d-8c0d-dd76da1f02a5"/>
@@ -34242,15 +34484,6 @@
 </ct:contentTypeSchema>
 </file>
 
-<file path=customXml/item2.xml><?xml version="1.0" encoding="utf-8"?>
-<?mso-contentType ?>
-<FormTemplates xmlns="http://schemas.microsoft.com/sharepoint/v3/contenttype/forms">
-  <Display>DocumentLibraryForm</Display>
-  <Edit>DocumentLibraryForm</Edit>
-  <New>DocumentLibraryForm</New>
-</FormTemplates>
-</file>
-
 <file path=customXml/item3.xml><?xml version="1.0" encoding="utf-8"?>
 <p:properties xmlns:p="http://schemas.microsoft.com/office/2006/metadata/properties" xmlns:xsi="http://www.w3.org/2001/XMLSchema-instance" xmlns:pc="http://schemas.microsoft.com/office/infopath/2007/PartnerControls">
   <documentManagement>
@@ -34261,6 +34494,14 @@
 </file>
 
 <file path=customXml/itemProps1.xml><?xml version="1.0" encoding="utf-8"?>
+<ds:datastoreItem xmlns:ds="http://schemas.openxmlformats.org/officeDocument/2006/customXml" ds:itemID="{2E5ECA37-C458-4BA2-A090-D7A19E07B434}">
+  <ds:schemaRefs>
+    <ds:schemaRef ds:uri="http://schemas.microsoft.com/sharepoint/v3/contenttype/forms"/>
+  </ds:schemaRefs>
+</ds:datastoreItem>
+</file>
+
+<file path=customXml/itemProps2.xml><?xml version="1.0" encoding="utf-8"?>
 <ds:datastoreItem xmlns:ds="http://schemas.openxmlformats.org/officeDocument/2006/customXml" ds:itemID="{7A26AAF5-6CFC-4C52-B7DF-08410EDE6701}">
   <ds:schemaRefs>
     <ds:schemaRef ds:uri="http://schemas.microsoft.com/office/2006/metadata/contentType"/>
@@ -34279,14 +34520,6 @@
 </ds:datastoreItem>
 </file>
 
-<file path=customXml/itemProps2.xml><?xml version="1.0" encoding="utf-8"?>
-<ds:datastoreItem xmlns:ds="http://schemas.openxmlformats.org/officeDocument/2006/customXml" ds:itemID="{2E5ECA37-C458-4BA2-A090-D7A19E07B434}">
-  <ds:schemaRefs>
-    <ds:schemaRef ds:uri="http://schemas.microsoft.com/sharepoint/v3/contenttype/forms"/>
-  </ds:schemaRefs>
-</ds:datastoreItem>
-</file>
-
 <file path=customXml/itemProps3.xml><?xml version="1.0" encoding="utf-8"?>
 <ds:datastoreItem xmlns:ds="http://schemas.openxmlformats.org/officeDocument/2006/customXml" ds:itemID="{84F503EC-3FFF-4193-A86F-39150E2BAC75}">
   <ds:schemaRefs>

</xml_diff>